<commit_message>
Make sure deletion works. Changes to slides.
</commit_message>
<xml_diff>
--- a/Slides.pptx
+++ b/Slides.pptx
@@ -7,11 +7,14 @@
   <p:sldIdLst>
     <p:sldId id="256" r:id="rId2"/>
     <p:sldId id="257" r:id="rId3"/>
-    <p:sldId id="258" r:id="rId4"/>
-    <p:sldId id="259" r:id="rId5"/>
-    <p:sldId id="260" r:id="rId6"/>
-    <p:sldId id="261" r:id="rId7"/>
-    <p:sldId id="262" r:id="rId8"/>
+    <p:sldId id="259" r:id="rId4"/>
+    <p:sldId id="260" r:id="rId5"/>
+    <p:sldId id="263" r:id="rId6"/>
+    <p:sldId id="264" r:id="rId7"/>
+    <p:sldId id="265" r:id="rId8"/>
+    <p:sldId id="261" r:id="rId9"/>
+    <p:sldId id="258" r:id="rId10"/>
+    <p:sldId id="262" r:id="rId11"/>
   </p:sldIdLst>
   <p:sldSz cx="9144000" cy="6858000" type="screen4x3"/>
   <p:notesSz cx="6858000" cy="9144000"/>
@@ -396,7 +399,7 @@
           <a:p>
             <a:fld id="{B01F9CA3-105E-4857-9057-6DB6197DA786}" type="datetimeFigureOut">
               <a:rPr lang="en-US" smtClean="0"/>
-              <a:t>7/10/14</a:t>
+              <a:t>7/16/14</a:t>
             </a:fld>
             <a:endParaRPr lang="en-US"/>
           </a:p>
@@ -588,7 +591,7 @@
           <a:p>
             <a:fld id="{B01F9CA3-105E-4857-9057-6DB6197DA786}" type="datetimeFigureOut">
               <a:rPr lang="en-US" smtClean="0"/>
-              <a:t>7/10/14</a:t>
+              <a:t>7/16/14</a:t>
             </a:fld>
             <a:endParaRPr lang="en-US"/>
           </a:p>
@@ -857,7 +860,7 @@
           <a:p>
             <a:fld id="{B01F9CA3-105E-4857-9057-6DB6197DA786}" type="datetimeFigureOut">
               <a:rPr lang="en-US" smtClean="0"/>
-              <a:t>7/10/14</a:t>
+              <a:t>7/16/14</a:t>
             </a:fld>
             <a:endParaRPr lang="en-US"/>
           </a:p>
@@ -1036,7 +1039,7 @@
           <a:p>
             <a:fld id="{B01F9CA3-105E-4857-9057-6DB6197DA786}" type="datetimeFigureOut">
               <a:rPr lang="en-US" smtClean="0"/>
-              <a:t>7/10/14</a:t>
+              <a:t>7/16/14</a:t>
             </a:fld>
             <a:endParaRPr lang="en-US"/>
           </a:p>
@@ -1205,7 +1208,7 @@
           <a:p>
             <a:fld id="{B01F9CA3-105E-4857-9057-6DB6197DA786}" type="datetimeFigureOut">
               <a:rPr lang="en-US" smtClean="0"/>
-              <a:t>7/10/14</a:t>
+              <a:t>7/16/14</a:t>
             </a:fld>
             <a:endParaRPr lang="en-US"/>
           </a:p>
@@ -1447,7 +1450,7 @@
           <a:p>
             <a:fld id="{B01F9CA3-105E-4857-9057-6DB6197DA786}" type="datetimeFigureOut">
               <a:rPr lang="en-US" smtClean="0"/>
-              <a:t>7/10/14</a:t>
+              <a:t>7/16/14</a:t>
             </a:fld>
             <a:endParaRPr lang="en-US"/>
           </a:p>
@@ -1770,7 +1773,7 @@
           <a:p>
             <a:fld id="{B01F9CA3-105E-4857-9057-6DB6197DA786}" type="datetimeFigureOut">
               <a:rPr lang="en-US" smtClean="0"/>
-              <a:t>7/10/14</a:t>
+              <a:t>7/16/14</a:t>
             </a:fld>
             <a:endParaRPr lang="en-US"/>
           </a:p>
@@ -2068,7 +2071,7 @@
           <a:p>
             <a:fld id="{B01F9CA3-105E-4857-9057-6DB6197DA786}" type="datetimeFigureOut">
               <a:rPr lang="en-US" smtClean="0"/>
-              <a:t>7/10/14</a:t>
+              <a:t>7/16/14</a:t>
             </a:fld>
             <a:endParaRPr lang="en-US"/>
           </a:p>
@@ -2524,7 +2527,7 @@
           <a:p>
             <a:fld id="{B01F9CA3-105E-4857-9057-6DB6197DA786}" type="datetimeFigureOut">
               <a:rPr lang="en-US" smtClean="0"/>
-              <a:t>7/10/14</a:t>
+              <a:t>7/16/14</a:t>
             </a:fld>
             <a:endParaRPr lang="en-US"/>
           </a:p>
@@ -2637,7 +2640,7 @@
           <a:p>
             <a:fld id="{B01F9CA3-105E-4857-9057-6DB6197DA786}" type="datetimeFigureOut">
               <a:rPr lang="en-US" smtClean="0"/>
-              <a:t>7/10/14</a:t>
+              <a:t>7/16/14</a:t>
             </a:fld>
             <a:endParaRPr lang="en-US"/>
           </a:p>
@@ -2727,7 +2730,7 @@
           <a:p>
             <a:fld id="{B01F9CA3-105E-4857-9057-6DB6197DA786}" type="datetimeFigureOut">
               <a:rPr lang="en-US" smtClean="0"/>
-              <a:t>7/10/14</a:t>
+              <a:t>7/16/14</a:t>
             </a:fld>
             <a:endParaRPr lang="en-US"/>
           </a:p>
@@ -3009,7 +3012,7 @@
           <a:p>
             <a:fld id="{B01F9CA3-105E-4857-9057-6DB6197DA786}" type="datetimeFigureOut">
               <a:rPr lang="en-US" smtClean="0"/>
-              <a:t>7/10/14</a:t>
+              <a:t>7/16/14</a:t>
             </a:fld>
             <a:endParaRPr lang="en-US"/>
           </a:p>
@@ -3215,7 +3218,7 @@
           <a:p>
             <a:fld id="{B01F9CA3-105E-4857-9057-6DB6197DA786}" type="datetimeFigureOut">
               <a:rPr lang="en-US" smtClean="0"/>
-              <a:t>7/10/14</a:t>
+              <a:t>7/16/14</a:t>
             </a:fld>
             <a:endParaRPr lang="en-US"/>
           </a:p>
@@ -3723,6 +3726,102 @@
 </p:sld>
 </file>
 
+<file path=ppt/slides/slide10.xml><?xml version="1.0" encoding="utf-8"?>
+<p:sld xmlns:a="http://schemas.openxmlformats.org/drawingml/2006/main" xmlns:r="http://schemas.openxmlformats.org/officeDocument/2006/relationships" xmlns:p="http://schemas.openxmlformats.org/presentationml/2006/main">
+  <p:cSld>
+    <p:spTree>
+      <p:nvGrpSpPr>
+        <p:cNvPr id="1" name=""/>
+        <p:cNvGrpSpPr/>
+        <p:nvPr/>
+      </p:nvGrpSpPr>
+      <p:grpSpPr>
+        <a:xfrm>
+          <a:off x="0" y="0"/>
+          <a:ext cx="0" cy="0"/>
+          <a:chOff x="0" y="0"/>
+          <a:chExt cx="0" cy="0"/>
+        </a:xfrm>
+      </p:grpSpPr>
+      <p:sp>
+        <p:nvSpPr>
+          <p:cNvPr id="2" name="Title 1"/>
+          <p:cNvSpPr>
+            <a:spLocks noGrp="1"/>
+          </p:cNvSpPr>
+          <p:nvPr>
+            <p:ph type="title"/>
+          </p:nvPr>
+        </p:nvSpPr>
+        <p:spPr/>
+        <p:txBody>
+          <a:bodyPr/>
+          <a:lstStyle/>
+          <a:p>
+            <a:r>
+              <a:rPr lang="en-US" dirty="0" smtClean="0"/>
+              <a:t>The Truth</a:t>
+            </a:r>
+            <a:endParaRPr lang="en-US" dirty="0"/>
+          </a:p>
+        </p:txBody>
+      </p:sp>
+      <p:sp>
+        <p:nvSpPr>
+          <p:cNvPr id="3" name="Content Placeholder 2"/>
+          <p:cNvSpPr>
+            <a:spLocks noGrp="1"/>
+          </p:cNvSpPr>
+          <p:nvPr>
+            <p:ph idx="1"/>
+          </p:nvPr>
+        </p:nvSpPr>
+        <p:spPr/>
+        <p:txBody>
+          <a:bodyPr/>
+          <a:lstStyle/>
+          <a:p>
+            <a:r>
+              <a:rPr lang="en-US" dirty="0" smtClean="0"/>
+              <a:t>Out-of-the box it supports EF and most </a:t>
+            </a:r>
+            <a:r>
+              <a:rPr lang="en-US" dirty="0" err="1" smtClean="0"/>
+              <a:t>OData</a:t>
+            </a:r>
+            <a:r>
+              <a:rPr lang="en-US" dirty="0" smtClean="0"/>
+              <a:t> implementations</a:t>
+            </a:r>
+          </a:p>
+          <a:p>
+            <a:r>
+              <a:rPr lang="en-US" dirty="0" smtClean="0"/>
+              <a:t>Adapters have been written for other back-ends, like MongoDB</a:t>
+            </a:r>
+          </a:p>
+          <a:p>
+            <a:pPr lvl="1"/>
+            <a:r>
+              <a:rPr lang="en-US" dirty="0" smtClean="0"/>
+              <a:t>Even with the adapters, there’s a little more setup required</a:t>
+            </a:r>
+          </a:p>
+        </p:txBody>
+      </p:sp>
+    </p:spTree>
+    <p:extLst>
+      <p:ext uri="{BB962C8B-B14F-4D97-AF65-F5344CB8AC3E}">
+        <p14:creationId xmlns:p14="http://schemas.microsoft.com/office/powerpoint/2010/main" val="1919020740"/>
+      </p:ext>
+    </p:extLst>
+  </p:cSld>
+  <p:clrMapOvr>
+    <a:masterClrMapping/>
+  </p:clrMapOvr>
+</p:sld>
+</file>
+
 <file path=ppt/slides/slide2.xml><?xml version="1.0" encoding="utf-8"?>
 <p:sld xmlns:a="http://schemas.openxmlformats.org/drawingml/2006/main" xmlns:r="http://schemas.openxmlformats.org/officeDocument/2006/relationships" xmlns:p="http://schemas.openxmlformats.org/presentationml/2006/main">
   <p:cSld>
@@ -3781,29 +3880,54 @@
             <p:ph idx="1"/>
           </p:nvPr>
         </p:nvSpPr>
-        <p:spPr/>
-        <p:txBody>
-          <a:bodyPr/>
-          <a:lstStyle/>
-          <a:p>
+        <p:spPr>
+          <a:xfrm>
+            <a:off x="549275" y="2161345"/>
+            <a:ext cx="8042276" cy="3782255"/>
+          </a:xfrm>
+        </p:spPr>
+        <p:txBody>
+          <a:bodyPr/>
+          <a:lstStyle/>
+          <a:p>
+            <a:pPr>
+              <a:spcBef>
+                <a:spcPts val="5600"/>
+              </a:spcBef>
+            </a:pPr>
             <a:r>
               <a:rPr lang="en-US" dirty="0" smtClean="0"/>
               <a:t>Client-side querying</a:t>
             </a:r>
           </a:p>
           <a:p>
+            <a:pPr>
+              <a:spcBef>
+                <a:spcPts val="5600"/>
+              </a:spcBef>
+            </a:pPr>
             <a:r>
               <a:rPr lang="en-US" dirty="0" smtClean="0"/>
               <a:t>Client caching</a:t>
             </a:r>
           </a:p>
           <a:p>
+            <a:pPr>
+              <a:spcBef>
+                <a:spcPts val="5600"/>
+              </a:spcBef>
+            </a:pPr>
             <a:r>
               <a:rPr lang="en-US" dirty="0" smtClean="0"/>
               <a:t>Change tracking/listening</a:t>
             </a:r>
           </a:p>
           <a:p>
+            <a:pPr>
+              <a:spcBef>
+                <a:spcPts val="5600"/>
+              </a:spcBef>
+            </a:pPr>
             <a:r>
               <a:rPr lang="en-US" dirty="0" smtClean="0"/>
               <a:t>“Works well with the tools you use”</a:t>
@@ -3859,7 +3983,7 @@
           <a:p>
             <a:r>
               <a:rPr lang="en-US" dirty="0" smtClean="0"/>
-              <a:t>What tools?</a:t>
+              <a:t>The Basics</a:t>
             </a:r>
             <a:endParaRPr lang="en-US" dirty="0"/>
           </a:p>
@@ -3872,92 +3996,53 @@
             <a:spLocks noGrp="1"/>
           </p:cNvSpPr>
           <p:nvPr>
-            <p:ph sz="half" idx="1"/>
-          </p:nvPr>
-        </p:nvSpPr>
-        <p:spPr/>
-        <p:txBody>
-          <a:bodyPr/>
-          <a:lstStyle/>
-          <a:p>
-            <a:r>
-              <a:rPr lang="en-US" dirty="0" smtClean="0"/>
-              <a:t>Angular</a:t>
-            </a:r>
-          </a:p>
-          <a:p>
-            <a:r>
-              <a:rPr lang="en-US" dirty="0" smtClean="0"/>
-              <a:t>Backbone</a:t>
-            </a:r>
-          </a:p>
-          <a:p>
-            <a:r>
-              <a:rPr lang="en-US" dirty="0" smtClean="0"/>
-              <a:t>Knockout</a:t>
-            </a:r>
-          </a:p>
-          <a:p>
-            <a:r>
-              <a:rPr lang="en-US" dirty="0" smtClean="0"/>
-              <a:t>Node</a:t>
-            </a:r>
-          </a:p>
-          <a:p>
-            <a:r>
-              <a:rPr lang="en-US" dirty="0" smtClean="0"/>
-              <a:t>Express</a:t>
-            </a:r>
-          </a:p>
-        </p:txBody>
-      </p:sp>
-      <p:sp>
-        <p:nvSpPr>
-          <p:cNvPr id="4" name="Content Placeholder 3"/>
-          <p:cNvSpPr>
-            <a:spLocks noGrp="1"/>
-          </p:cNvSpPr>
-          <p:nvPr>
-            <p:ph sz="half" idx="2"/>
-          </p:nvPr>
-        </p:nvSpPr>
-        <p:spPr/>
-        <p:txBody>
-          <a:bodyPr/>
-          <a:lstStyle/>
-          <a:p>
-            <a:r>
-              <a:rPr lang="en-US" dirty="0" smtClean="0"/>
-              <a:t>Open Data Protocol</a:t>
-            </a:r>
-          </a:p>
-          <a:p>
-            <a:r>
-              <a:rPr lang="en-US" dirty="0" smtClean="0"/>
-              <a:t>Require</a:t>
-            </a:r>
-          </a:p>
-          <a:p>
-            <a:r>
-              <a:rPr lang="en-US" dirty="0" smtClean="0"/>
-              <a:t>Ruby</a:t>
-            </a:r>
-          </a:p>
-          <a:p>
-            <a:r>
-              <a:rPr lang="en-US" dirty="0" smtClean="0"/>
-              <a:t>MongoDB</a:t>
-            </a:r>
-          </a:p>
-          <a:p>
-            <a:r>
-              <a:rPr lang="en-US" dirty="0"/>
-              <a:t>.</a:t>
-            </a:r>
-            <a:r>
-              <a:rPr lang="en-US" dirty="0" smtClean="0"/>
-              <a:t>NET</a:t>
-            </a:r>
+            <p:ph idx="1"/>
+          </p:nvPr>
+        </p:nvSpPr>
+        <p:spPr/>
+        <p:txBody>
+          <a:bodyPr/>
+          <a:lstStyle/>
+          <a:p>
+            <a:r>
+              <a:rPr lang="en-US" dirty="0" smtClean="0"/>
+              <a:t>It’s all about the </a:t>
+            </a:r>
+            <a:r>
+              <a:rPr lang="en-US" dirty="0" err="1" smtClean="0"/>
+              <a:t>EntityManager</a:t>
+            </a:r>
+            <a:endParaRPr lang="en-US" dirty="0" smtClean="0"/>
+          </a:p>
+          <a:p>
+            <a:pPr lvl="1"/>
+            <a:r>
+              <a:rPr lang="en-US" dirty="0" smtClean="0"/>
+              <a:t>Executes queries</a:t>
+            </a:r>
+          </a:p>
+          <a:p>
+            <a:pPr lvl="1"/>
+            <a:r>
+              <a:rPr lang="en-US" dirty="0" smtClean="0"/>
+              <a:t>Caches data</a:t>
+            </a:r>
+          </a:p>
+          <a:p>
+            <a:pPr lvl="1"/>
+            <a:r>
+              <a:rPr lang="en-US" dirty="0" smtClean="0"/>
+              <a:t>Uses metadata about the data model to create “entities”</a:t>
+            </a:r>
+          </a:p>
+          <a:p>
+            <a:pPr lvl="1"/>
+            <a:r>
+              <a:rPr lang="en-US" dirty="0" smtClean="0"/>
+              <a:t>Persists changes to your remote persistence service in asynchronous batches</a:t>
+            </a:r>
+          </a:p>
+          <a:p>
             <a:endParaRPr lang="en-US" dirty="0"/>
           </a:p>
         </p:txBody>
@@ -3965,7 +4050,7 @@
     </p:spTree>
     <p:extLst>
       <p:ext uri="{BB962C8B-B14F-4D97-AF65-F5344CB8AC3E}">
-        <p14:creationId xmlns:p14="http://schemas.microsoft.com/office/powerpoint/2010/main" val="2829670527"/>
+        <p14:creationId xmlns:p14="http://schemas.microsoft.com/office/powerpoint/2010/main" val="2178100238"/>
       </p:ext>
     </p:extLst>
   </p:cSld>
@@ -4007,10 +4092,6 @@
           <a:bodyPr/>
           <a:lstStyle/>
           <a:p>
-            <a:r>
-              <a:rPr lang="en-US" dirty="0" smtClean="0"/>
-              <a:t>The Basics</a:t>
-            </a:r>
             <a:endParaRPr lang="en-US" dirty="0"/>
           </a:p>
         </p:txBody>
@@ -4032,51 +4113,36 @@
           <a:p>
             <a:r>
               <a:rPr lang="en-US" dirty="0" smtClean="0"/>
-              <a:t>It’s all about the </a:t>
-            </a:r>
-            <a:r>
-              <a:rPr lang="en-US" dirty="0" err="1" smtClean="0"/>
-              <a:t>EntityManager</a:t>
-            </a:r>
-            <a:endParaRPr lang="en-US" dirty="0" smtClean="0"/>
+              <a:t>The breeze “Entity”</a:t>
+            </a:r>
           </a:p>
           <a:p>
             <a:pPr lvl="1"/>
             <a:r>
               <a:rPr lang="en-US" dirty="0" smtClean="0"/>
-              <a:t>Executes queries</a:t>
+              <a:t>Has data properties describing a “thing”, maybe a Customer or Product</a:t>
             </a:r>
           </a:p>
           <a:p>
             <a:pPr lvl="1"/>
             <a:r>
               <a:rPr lang="en-US" dirty="0" smtClean="0"/>
-              <a:t>Caches data</a:t>
+              <a:t>Has navigation properties to related entities</a:t>
             </a:r>
           </a:p>
           <a:p>
             <a:pPr lvl="1"/>
             <a:r>
               <a:rPr lang="en-US" dirty="0" smtClean="0"/>
-              <a:t>Uses metadata about the data model to create “entities”</a:t>
-            </a:r>
-          </a:p>
-          <a:p>
-            <a:pPr lvl="1"/>
-            <a:r>
-              <a:rPr lang="en-US" dirty="0" smtClean="0"/>
-              <a:t>Persists changes to your remote persistence service in asynchronous batches</a:t>
-            </a:r>
-          </a:p>
-          <a:p>
-            <a:endParaRPr lang="en-US" dirty="0"/>
+              <a:t>Contains metadata to indicate the state of the entity (added, modified, deleted, etc.)</a:t>
+            </a:r>
           </a:p>
         </p:txBody>
       </p:sp>
     </p:spTree>
     <p:extLst>
       <p:ext uri="{BB962C8B-B14F-4D97-AF65-F5344CB8AC3E}">
-        <p14:creationId xmlns:p14="http://schemas.microsoft.com/office/powerpoint/2010/main" val="2178100238"/>
+        <p14:creationId xmlns:p14="http://schemas.microsoft.com/office/powerpoint/2010/main" val="3354792708"/>
       </p:ext>
     </p:extLst>
   </p:cSld>
@@ -4118,6 +4184,10 @@
           <a:bodyPr/>
           <a:lstStyle/>
           <a:p>
+            <a:r>
+              <a:rPr lang="en-US" dirty="0" smtClean="0"/>
+              <a:t>Client-side Queries</a:t>
+            </a:r>
             <a:endParaRPr lang="en-US" dirty="0"/>
           </a:p>
         </p:txBody>
@@ -4139,36 +4209,41 @@
           <a:p>
             <a:r>
               <a:rPr lang="en-US" dirty="0" smtClean="0"/>
-              <a:t>The breeze “Entity”</a:t>
-            </a:r>
-          </a:p>
-          <a:p>
-            <a:pPr lvl="1"/>
-            <a:r>
-              <a:rPr lang="en-US" dirty="0" smtClean="0"/>
-              <a:t>Has data properties describing a “thing”, maybe a Customer or Product</a:t>
-            </a:r>
-          </a:p>
-          <a:p>
-            <a:pPr lvl="1"/>
-            <a:r>
-              <a:rPr lang="en-US" dirty="0" smtClean="0"/>
-              <a:t>Has navigation properties to related entities</a:t>
-            </a:r>
-          </a:p>
-          <a:p>
-            <a:pPr lvl="1"/>
-            <a:r>
-              <a:rPr lang="en-US" dirty="0" smtClean="0"/>
-              <a:t>Contains metadata to indicate the state of the entity (added, modified, deleted, etc.)</a:t>
-            </a:r>
+              <a:t>With breeze you rarely need to query the database in your server-side code</a:t>
+            </a:r>
+          </a:p>
+          <a:p>
+            <a:r>
+              <a:rPr lang="en-US" dirty="0" smtClean="0"/>
+              <a:t>Instead you can query all your data in JavaScript like this:</a:t>
+            </a:r>
+          </a:p>
+          <a:p>
+            <a:pPr marL="349250" lvl="1" indent="0">
+              <a:buNone/>
+            </a:pPr>
+            <a:endParaRPr lang="en-US" dirty="0" smtClean="0"/>
+          </a:p>
+          <a:p>
+            <a:pPr marL="349250" lvl="1" indent="0">
+              <a:buNone/>
+            </a:pPr>
+            <a:r>
+              <a:rPr lang="en-US" dirty="0" err="1" smtClean="0"/>
+              <a:t>breeze.EntityQuery.from</a:t>
+            </a:r>
+            <a:r>
+              <a:rPr lang="en-US" dirty="0" smtClean="0"/>
+              <a:t>(‘Customers’)</a:t>
+            </a:r>
+            <a:endParaRPr lang="en-US" dirty="0"/>
           </a:p>
         </p:txBody>
       </p:sp>
     </p:spTree>
     <p:extLst>
       <p:ext uri="{BB962C8B-B14F-4D97-AF65-F5344CB8AC3E}">
-        <p14:creationId xmlns:p14="http://schemas.microsoft.com/office/powerpoint/2010/main" val="3354792708"/>
+        <p14:creationId xmlns:p14="http://schemas.microsoft.com/office/powerpoint/2010/main" val="2273404312"/>
       </p:ext>
     </p:extLst>
   </p:cSld>
@@ -4212,7 +4287,7 @@
           <a:p>
             <a:r>
               <a:rPr lang="en-US" dirty="0" smtClean="0"/>
-              <a:t>Breeze Metadata</a:t>
+              <a:t>Client Caching</a:t>
             </a:r>
             <a:endParaRPr lang="en-US" dirty="0"/>
           </a:p>
@@ -4231,69 +4306,93 @@
         <p:spPr/>
         <p:txBody>
           <a:bodyPr>
-            <a:normAutofit lnSpcReduction="10000"/>
+            <a:normAutofit fontScale="85000" lnSpcReduction="20000"/>
           </a:bodyPr>
           <a:lstStyle/>
           <a:p>
             <a:r>
               <a:rPr lang="en-US" dirty="0" smtClean="0"/>
-              <a:t>Data about how your data is structured</a:t>
-            </a:r>
-          </a:p>
-          <a:p>
-            <a:r>
-              <a:rPr lang="en-US" dirty="0" smtClean="0"/>
-              <a:t>Uses this to</a:t>
+              <a:t>Breeze caches entities in memory for a snappier UI</a:t>
+            </a:r>
+          </a:p>
+          <a:p>
+            <a:r>
+              <a:rPr lang="en-US" dirty="0" smtClean="0"/>
+              <a:t>Entities enter the cache</a:t>
             </a:r>
           </a:p>
           <a:p>
             <a:pPr lvl="1"/>
             <a:r>
               <a:rPr lang="en-US" dirty="0" smtClean="0"/>
-              <a:t>Provide client-side validation</a:t>
+              <a:t>As a result of a query</a:t>
             </a:r>
           </a:p>
           <a:p>
             <a:pPr lvl="1"/>
             <a:r>
               <a:rPr lang="en-US" dirty="0" smtClean="0"/>
-              <a:t>Know how to communicate with the persistence service</a:t>
+              <a:t>By adding them directly</a:t>
             </a:r>
           </a:p>
           <a:p>
             <a:pPr lvl="1"/>
             <a:r>
               <a:rPr lang="en-US" dirty="0" smtClean="0"/>
-              <a:t>Create navigation properties on the client</a:t>
-            </a:r>
-          </a:p>
-          <a:p>
-            <a:r>
-              <a:rPr lang="en-US" dirty="0" smtClean="0"/>
-              <a:t>How does Breeze get it?</a:t>
+              <a:t>By importing them from another </a:t>
+            </a:r>
+            <a:r>
+              <a:rPr lang="en-US" dirty="0" err="1" smtClean="0"/>
+              <a:t>EntityManager</a:t>
+            </a:r>
+            <a:endParaRPr lang="en-US" dirty="0" smtClean="0"/>
+          </a:p>
+          <a:p>
+            <a:r>
+              <a:rPr lang="en-US" dirty="0" smtClean="0"/>
+              <a:t>Entities leave the cache</a:t>
             </a:r>
           </a:p>
           <a:p>
             <a:pPr lvl="1"/>
             <a:r>
               <a:rPr lang="en-US" dirty="0" smtClean="0"/>
-              <a:t>Hits a metadata route</a:t>
+              <a:t>When saving an entity marked as deleted</a:t>
             </a:r>
           </a:p>
           <a:p>
             <a:pPr lvl="1"/>
             <a:r>
               <a:rPr lang="en-US" dirty="0" smtClean="0"/>
-              <a:t>Define the metadata yourself either client-side or server-side for back-ends that don’t supply it</a:t>
-            </a:r>
-            <a:endParaRPr lang="en-US" dirty="0"/>
+              <a:t>When removing them manually</a:t>
+            </a:r>
+          </a:p>
+          <a:p>
+            <a:r>
+              <a:rPr lang="en-US" dirty="0" smtClean="0"/>
+              <a:t>Can query the cache, the server, or both with same query object:</a:t>
+            </a:r>
+          </a:p>
+          <a:p>
+            <a:pPr lvl="1"/>
+            <a:r>
+              <a:rPr lang="en-US" dirty="0" smtClean="0"/>
+              <a:t>manager.executeQuery(query);</a:t>
+            </a:r>
+          </a:p>
+          <a:p>
+            <a:pPr lvl="1"/>
+            <a:r>
+              <a:rPr lang="en-US" dirty="0" smtClean="0"/>
+              <a:t>manager.executeQueryLocally(query);</a:t>
+            </a:r>
           </a:p>
         </p:txBody>
       </p:sp>
     </p:spTree>
     <p:extLst>
       <p:ext uri="{BB962C8B-B14F-4D97-AF65-F5344CB8AC3E}">
-        <p14:creationId xmlns:p14="http://schemas.microsoft.com/office/powerpoint/2010/main" val="1029788528"/>
+        <p14:creationId xmlns:p14="http://schemas.microsoft.com/office/powerpoint/2010/main" val="579367256"/>
       </p:ext>
     </p:extLst>
   </p:cSld>
@@ -4337,7 +4436,7 @@
           <a:p>
             <a:r>
               <a:rPr lang="en-US" dirty="0" smtClean="0"/>
-              <a:t>The Truth</a:t>
+              <a:t>Change tracking/listening</a:t>
             </a:r>
             <a:endParaRPr lang="en-US" dirty="0"/>
           </a:p>
@@ -4355,33 +4454,119 @@
         </p:nvSpPr>
         <p:spPr/>
         <p:txBody>
-          <a:bodyPr/>
-          <a:lstStyle/>
-          <a:p>
-            <a:r>
-              <a:rPr lang="en-US" dirty="0" smtClean="0"/>
-              <a:t>Out-of-the box it supports EF and most </a:t>
-            </a:r>
+          <a:bodyPr>
+            <a:normAutofit lnSpcReduction="10000"/>
+          </a:bodyPr>
+          <a:lstStyle/>
+          <a:p>
+            <a:r>
+              <a:rPr lang="en-US" dirty="0" smtClean="0"/>
+              <a:t>Entities keep track of their EntityState: Added, Modified, Deleted, etc.</a:t>
+            </a:r>
+          </a:p>
+          <a:p>
+            <a:r>
+              <a:rPr lang="en-US" dirty="0" smtClean="0"/>
+              <a:t>Listen for property or state changes:</a:t>
+            </a:r>
+          </a:p>
+          <a:p>
+            <a:pPr lvl="1"/>
             <a:r>
               <a:rPr lang="en-US" dirty="0" err="1" smtClean="0"/>
-              <a:t>OData</a:t>
-            </a:r>
-            <a:r>
-              <a:rPr lang="en-US" dirty="0" smtClean="0"/>
-              <a:t> implementations</a:t>
-            </a:r>
-          </a:p>
-          <a:p>
-            <a:r>
-              <a:rPr lang="en-US" dirty="0" smtClean="0"/>
-              <a:t>Adapters have been written for other back-ends, like MongoDB</a:t>
+              <a:t>user.entityAspect</a:t>
+            </a:r>
+            <a:endParaRPr lang="en-US" dirty="0" smtClean="0"/>
+          </a:p>
+          <a:p>
+            <a:pPr marL="349250" lvl="1" indent="0">
+              <a:buNone/>
+            </a:pPr>
+            <a:r>
+              <a:rPr lang="en-US" dirty="0"/>
+              <a:t>	</a:t>
+            </a:r>
+            <a:r>
+              <a:rPr lang="en-US" dirty="0" smtClean="0"/>
+              <a:t>.</a:t>
+            </a:r>
+            <a:r>
+              <a:rPr lang="en-US" dirty="0" err="1" smtClean="0"/>
+              <a:t>propertyChanged</a:t>
+            </a:r>
+            <a:endParaRPr lang="en-US" dirty="0" smtClean="0"/>
+          </a:p>
+          <a:p>
+            <a:pPr marL="349250" lvl="1" indent="0">
+              <a:buNone/>
+            </a:pPr>
+            <a:r>
+              <a:rPr lang="en-US" dirty="0"/>
+              <a:t>	</a:t>
+            </a:r>
+            <a:r>
+              <a:rPr lang="en-US" dirty="0" smtClean="0"/>
+              <a:t>.subscribe(function(</a:t>
+            </a:r>
+            <a:r>
+              <a:rPr lang="en-US" dirty="0" err="1" smtClean="0"/>
+              <a:t>args</a:t>
+            </a:r>
+            <a:r>
+              <a:rPr lang="en-US" dirty="0" smtClean="0"/>
+              <a:t>) {…}</a:t>
             </a:r>
           </a:p>
           <a:p>
             <a:pPr lvl="1"/>
             <a:r>
               <a:rPr lang="en-US" dirty="0" smtClean="0"/>
-              <a:t>Even with the adapters, there’s a little more setup required</a:t>
+              <a:t>manager</a:t>
+            </a:r>
+          </a:p>
+          <a:p>
+            <a:pPr marL="349250" lvl="1" indent="0">
+              <a:buNone/>
+            </a:pPr>
+            <a:r>
+              <a:rPr lang="en-US" dirty="0"/>
+              <a:t>	</a:t>
+            </a:r>
+            <a:r>
+              <a:rPr lang="en-US" dirty="0" smtClean="0"/>
+              <a:t>.</a:t>
+            </a:r>
+            <a:r>
+              <a:rPr lang="en-US" dirty="0" err="1" smtClean="0"/>
+              <a:t>entityChanged</a:t>
+            </a:r>
+            <a:endParaRPr lang="en-US" dirty="0" smtClean="0"/>
+          </a:p>
+          <a:p>
+            <a:pPr marL="349250" lvl="1" indent="0">
+              <a:buNone/>
+            </a:pPr>
+            <a:r>
+              <a:rPr lang="en-US" dirty="0"/>
+              <a:t>	</a:t>
+            </a:r>
+            <a:r>
+              <a:rPr lang="en-US" dirty="0" smtClean="0"/>
+              <a:t>.subscribe(function (</a:t>
+            </a:r>
+            <a:r>
+              <a:rPr lang="en-US" dirty="0" err="1" smtClean="0"/>
+              <a:t>args</a:t>
+            </a:r>
+            <a:r>
+              <a:rPr lang="en-US" dirty="0" smtClean="0"/>
+              <a:t>) {…}</a:t>
+            </a:r>
+          </a:p>
+          <a:p>
+            <a:r>
+              <a:rPr lang="en-US" dirty="0" smtClean="0"/>
+              <a:t>Listen for validation errors similarly</a:t>
             </a:r>
           </a:p>
         </p:txBody>
@@ -4389,7 +4574,292 @@
     </p:spTree>
     <p:extLst>
       <p:ext uri="{BB962C8B-B14F-4D97-AF65-F5344CB8AC3E}">
-        <p14:creationId xmlns:p14="http://schemas.microsoft.com/office/powerpoint/2010/main" val="1919020740"/>
+        <p14:creationId xmlns:p14="http://schemas.microsoft.com/office/powerpoint/2010/main" val="2795811628"/>
+      </p:ext>
+    </p:extLst>
+  </p:cSld>
+  <p:clrMapOvr>
+    <a:masterClrMapping/>
+  </p:clrMapOvr>
+</p:sld>
+</file>
+
+<file path=ppt/slides/slide8.xml><?xml version="1.0" encoding="utf-8"?>
+<p:sld xmlns:a="http://schemas.openxmlformats.org/drawingml/2006/main" xmlns:r="http://schemas.openxmlformats.org/officeDocument/2006/relationships" xmlns:p="http://schemas.openxmlformats.org/presentationml/2006/main">
+  <p:cSld>
+    <p:spTree>
+      <p:nvGrpSpPr>
+        <p:cNvPr id="1" name=""/>
+        <p:cNvGrpSpPr/>
+        <p:nvPr/>
+      </p:nvGrpSpPr>
+      <p:grpSpPr>
+        <a:xfrm>
+          <a:off x="0" y="0"/>
+          <a:ext cx="0" cy="0"/>
+          <a:chOff x="0" y="0"/>
+          <a:chExt cx="0" cy="0"/>
+        </a:xfrm>
+      </p:grpSpPr>
+      <p:sp>
+        <p:nvSpPr>
+          <p:cNvPr id="2" name="Title 1"/>
+          <p:cNvSpPr>
+            <a:spLocks noGrp="1"/>
+          </p:cNvSpPr>
+          <p:nvPr>
+            <p:ph type="title"/>
+          </p:nvPr>
+        </p:nvSpPr>
+        <p:spPr/>
+        <p:txBody>
+          <a:bodyPr/>
+          <a:lstStyle/>
+          <a:p>
+            <a:r>
+              <a:rPr lang="en-US" dirty="0" smtClean="0"/>
+              <a:t>Breeze Metadata</a:t>
+            </a:r>
+            <a:endParaRPr lang="en-US" dirty="0"/>
+          </a:p>
+        </p:txBody>
+      </p:sp>
+      <p:sp>
+        <p:nvSpPr>
+          <p:cNvPr id="3" name="Content Placeholder 2"/>
+          <p:cNvSpPr>
+            <a:spLocks noGrp="1"/>
+          </p:cNvSpPr>
+          <p:nvPr>
+            <p:ph idx="1"/>
+          </p:nvPr>
+        </p:nvSpPr>
+        <p:spPr/>
+        <p:txBody>
+          <a:bodyPr>
+            <a:normAutofit lnSpcReduction="10000"/>
+          </a:bodyPr>
+          <a:lstStyle/>
+          <a:p>
+            <a:r>
+              <a:rPr lang="en-US" dirty="0" smtClean="0"/>
+              <a:t>Data about how your data is structured</a:t>
+            </a:r>
+          </a:p>
+          <a:p>
+            <a:r>
+              <a:rPr lang="en-US" dirty="0" smtClean="0"/>
+              <a:t>Uses this to</a:t>
+            </a:r>
+          </a:p>
+          <a:p>
+            <a:pPr lvl="1"/>
+            <a:r>
+              <a:rPr lang="en-US" dirty="0" smtClean="0"/>
+              <a:t>Provide client-side validation</a:t>
+            </a:r>
+          </a:p>
+          <a:p>
+            <a:pPr lvl="1"/>
+            <a:r>
+              <a:rPr lang="en-US" dirty="0" smtClean="0"/>
+              <a:t>Know how to communicate with the persistence service</a:t>
+            </a:r>
+          </a:p>
+          <a:p>
+            <a:pPr lvl="1"/>
+            <a:r>
+              <a:rPr lang="en-US" dirty="0" smtClean="0"/>
+              <a:t>Create navigation properties on the client</a:t>
+            </a:r>
+          </a:p>
+          <a:p>
+            <a:r>
+              <a:rPr lang="en-US" dirty="0" smtClean="0"/>
+              <a:t>How does Breeze get it?</a:t>
+            </a:r>
+          </a:p>
+          <a:p>
+            <a:pPr lvl="1"/>
+            <a:r>
+              <a:rPr lang="en-US" dirty="0" smtClean="0"/>
+              <a:t>Hits a metadata route</a:t>
+            </a:r>
+          </a:p>
+          <a:p>
+            <a:pPr lvl="1"/>
+            <a:r>
+              <a:rPr lang="en-US" dirty="0" smtClean="0"/>
+              <a:t>Define the metadata yourself either client-side or server-side for back-ends that don’t supply it</a:t>
+            </a:r>
+            <a:endParaRPr lang="en-US" dirty="0"/>
+          </a:p>
+        </p:txBody>
+      </p:sp>
+    </p:spTree>
+    <p:extLst>
+      <p:ext uri="{BB962C8B-B14F-4D97-AF65-F5344CB8AC3E}">
+        <p14:creationId xmlns:p14="http://schemas.microsoft.com/office/powerpoint/2010/main" val="1029788528"/>
+      </p:ext>
+    </p:extLst>
+  </p:cSld>
+  <p:clrMapOvr>
+    <a:masterClrMapping/>
+  </p:clrMapOvr>
+</p:sld>
+</file>
+
+<file path=ppt/slides/slide9.xml><?xml version="1.0" encoding="utf-8"?>
+<p:sld xmlns:a="http://schemas.openxmlformats.org/drawingml/2006/main" xmlns:r="http://schemas.openxmlformats.org/officeDocument/2006/relationships" xmlns:p="http://schemas.openxmlformats.org/presentationml/2006/main">
+  <p:cSld>
+    <p:spTree>
+      <p:nvGrpSpPr>
+        <p:cNvPr id="1" name=""/>
+        <p:cNvGrpSpPr/>
+        <p:nvPr/>
+      </p:nvGrpSpPr>
+      <p:grpSpPr>
+        <a:xfrm>
+          <a:off x="0" y="0"/>
+          <a:ext cx="0" cy="0"/>
+          <a:chOff x="0" y="0"/>
+          <a:chExt cx="0" cy="0"/>
+        </a:xfrm>
+      </p:grpSpPr>
+      <p:sp>
+        <p:nvSpPr>
+          <p:cNvPr id="2" name="Title 1"/>
+          <p:cNvSpPr>
+            <a:spLocks noGrp="1"/>
+          </p:cNvSpPr>
+          <p:nvPr>
+            <p:ph type="title"/>
+          </p:nvPr>
+        </p:nvSpPr>
+        <p:spPr/>
+        <p:txBody>
+          <a:bodyPr/>
+          <a:lstStyle/>
+          <a:p>
+            <a:r>
+              <a:rPr lang="en-US" dirty="0" smtClean="0"/>
+              <a:t>What tools can I use with Breeze?</a:t>
+            </a:r>
+            <a:endParaRPr lang="en-US" dirty="0"/>
+          </a:p>
+        </p:txBody>
+      </p:sp>
+      <p:sp>
+        <p:nvSpPr>
+          <p:cNvPr id="3" name="Content Placeholder 2"/>
+          <p:cNvSpPr>
+            <a:spLocks noGrp="1"/>
+          </p:cNvSpPr>
+          <p:nvPr>
+            <p:ph sz="half" idx="1"/>
+          </p:nvPr>
+        </p:nvSpPr>
+        <p:spPr>
+          <a:xfrm>
+            <a:off x="549275" y="2222401"/>
+            <a:ext cx="3840480" cy="3721200"/>
+          </a:xfrm>
+        </p:spPr>
+        <p:txBody>
+          <a:bodyPr/>
+          <a:lstStyle/>
+          <a:p>
+            <a:r>
+              <a:rPr lang="en-US" dirty="0" smtClean="0"/>
+              <a:t>Angular</a:t>
+            </a:r>
+          </a:p>
+          <a:p>
+            <a:r>
+              <a:rPr lang="en-US" dirty="0" smtClean="0"/>
+              <a:t>Backbone</a:t>
+            </a:r>
+          </a:p>
+          <a:p>
+            <a:r>
+              <a:rPr lang="en-US" dirty="0" smtClean="0"/>
+              <a:t>Knockout</a:t>
+            </a:r>
+          </a:p>
+          <a:p>
+            <a:r>
+              <a:rPr lang="en-US" dirty="0" smtClean="0"/>
+              <a:t>Node</a:t>
+            </a:r>
+          </a:p>
+          <a:p>
+            <a:r>
+              <a:rPr lang="en-US" dirty="0" smtClean="0"/>
+              <a:t>Express</a:t>
+            </a:r>
+          </a:p>
+        </p:txBody>
+      </p:sp>
+      <p:sp>
+        <p:nvSpPr>
+          <p:cNvPr id="4" name="Content Placeholder 3"/>
+          <p:cNvSpPr>
+            <a:spLocks noGrp="1"/>
+          </p:cNvSpPr>
+          <p:nvPr>
+            <p:ph sz="half" idx="2"/>
+          </p:nvPr>
+        </p:nvSpPr>
+        <p:spPr>
+          <a:xfrm>
+            <a:off x="4751071" y="2222401"/>
+            <a:ext cx="3840480" cy="3721200"/>
+          </a:xfrm>
+        </p:spPr>
+        <p:txBody>
+          <a:bodyPr/>
+          <a:lstStyle/>
+          <a:p>
+            <a:r>
+              <a:rPr lang="en-US" dirty="0" smtClean="0"/>
+              <a:t>Open Data Protocol</a:t>
+            </a:r>
+          </a:p>
+          <a:p>
+            <a:r>
+              <a:rPr lang="en-US" dirty="0" smtClean="0"/>
+              <a:t>Require</a:t>
+            </a:r>
+          </a:p>
+          <a:p>
+            <a:r>
+              <a:rPr lang="en-US" dirty="0" smtClean="0"/>
+              <a:t>Ruby</a:t>
+            </a:r>
+          </a:p>
+          <a:p>
+            <a:r>
+              <a:rPr lang="en-US" dirty="0" smtClean="0"/>
+              <a:t>MongoDB</a:t>
+            </a:r>
+          </a:p>
+          <a:p>
+            <a:r>
+              <a:rPr lang="en-US" dirty="0"/>
+              <a:t>.</a:t>
+            </a:r>
+            <a:r>
+              <a:rPr lang="en-US" dirty="0" smtClean="0"/>
+              <a:t>NET</a:t>
+            </a:r>
+            <a:endParaRPr lang="en-US" dirty="0"/>
+          </a:p>
+        </p:txBody>
+      </p:sp>
+    </p:spTree>
+    <p:extLst>
+      <p:ext uri="{BB962C8B-B14F-4D97-AF65-F5344CB8AC3E}">
+        <p14:creationId xmlns:p14="http://schemas.microsoft.com/office/powerpoint/2010/main" val="2829670527"/>
       </p:ext>
     </p:extLst>
   </p:cSld>

</xml_diff>